<commit_message>
Modifications to the slides
</commit_message>
<xml_diff>
--- a/crash-course-on-data-science/introduction.pptx
+++ b/crash-course-on-data-science/introduction.pptx
@@ -5,13 +5,14 @@
     <p:sldMasterId id="2147483648" r:id="rId1"/>
   </p:sldMasterIdLst>
   <p:notesMasterIdLst>
-    <p:notesMasterId r:id="rId6"/>
+    <p:notesMasterId r:id="rId7"/>
   </p:notesMasterIdLst>
   <p:sldIdLst>
     <p:sldId id="256" r:id="rId2"/>
     <p:sldId id="257" r:id="rId3"/>
-    <p:sldId id="259" r:id="rId4"/>
-    <p:sldId id="258" r:id="rId5"/>
+    <p:sldId id="260" r:id="rId4"/>
+    <p:sldId id="259" r:id="rId5"/>
+    <p:sldId id="258" r:id="rId6"/>
   </p:sldIdLst>
   <p:sldSz cx="12192000" cy="6858000"/>
   <p:notesSz cx="6858000" cy="9144000"/>
@@ -200,7 +201,7 @@
           <a:p>
             <a:fld id="{75F33DB8-B60E-4E3C-A60C-26201D013AC9}" type="datetimeFigureOut">
               <a:rPr lang="en-US" smtClean="0"/>
-              <a:t>2/10/2025</a:t>
+              <a:t>2/18/2025</a:t>
             </a:fld>
             <a:endParaRPr lang="en-US"/>
           </a:p>
@@ -3463,7 +3464,7 @@
           <p:cNvPr id="2" name="Titre 1">
             <a:extLst>
               <a:ext uri="{FF2B5EF4-FFF2-40B4-BE49-F238E27FC236}">
-                <a16:creationId xmlns:a16="http://schemas.microsoft.com/office/drawing/2014/main" id="{83C8689B-5A71-4792-998D-2879B2A61738}"/>
+                <a16:creationId xmlns:a16="http://schemas.microsoft.com/office/drawing/2014/main" id="{042451A0-D540-4736-A40C-B5749956C125}"/>
               </a:ext>
             </a:extLst>
           </p:cNvPr>
@@ -3481,7 +3482,7 @@
           <a:p>
             <a:r>
               <a:rPr lang="en-US" dirty="0"/>
-              <a:t>Who am I?</a:t>
+              <a:t>Subjects</a:t>
             </a:r>
           </a:p>
         </p:txBody>
@@ -3491,7 +3492,7 @@
           <p:cNvPr id="3" name="Espace réservé du contenu 2">
             <a:extLst>
               <a:ext uri="{FF2B5EF4-FFF2-40B4-BE49-F238E27FC236}">
-                <a16:creationId xmlns:a16="http://schemas.microsoft.com/office/drawing/2014/main" id="{5421B09B-39CA-4FB9-AB85-EE30FE1990BE}"/>
+                <a16:creationId xmlns:a16="http://schemas.microsoft.com/office/drawing/2014/main" id="{2278C8B0-644B-4E2A-B6DE-62C188A26758}"/>
               </a:ext>
             </a:extLst>
           </p:cNvPr>
@@ -3507,7 +3508,28 @@
           <a:bodyPr/>
           <a:lstStyle/>
           <a:p>
-            <a:endParaRPr lang="en-US"/>
+            <a:r>
+              <a:rPr lang="en-US" dirty="0"/>
+              <a:t>A quick glance at computer science</a:t>
+            </a:r>
+          </a:p>
+          <a:p>
+            <a:r>
+              <a:rPr lang="en-US" dirty="0"/>
+              <a:t>Version control with git</a:t>
+            </a:r>
+          </a:p>
+          <a:p>
+            <a:r>
+              <a:rPr lang="en-US" dirty="0"/>
+              <a:t>Good practices of coding (in Python)</a:t>
+            </a:r>
+          </a:p>
+          <a:p>
+            <a:r>
+              <a:rPr lang="en-US" dirty="0"/>
+              <a:t>Machine learning</a:t>
+            </a:r>
           </a:p>
         </p:txBody>
       </p:sp>
@@ -3516,7 +3538,7 @@
           <p:cNvPr id="4" name="Espace réservé du numéro de diapositive 3">
             <a:extLst>
               <a:ext uri="{FF2B5EF4-FFF2-40B4-BE49-F238E27FC236}">
-                <a16:creationId xmlns:a16="http://schemas.microsoft.com/office/drawing/2014/main" id="{DF063B55-A8AB-4369-B7D8-6718B065E46B}"/>
+                <a16:creationId xmlns:a16="http://schemas.microsoft.com/office/drawing/2014/main" id="{86E087F0-CB76-46A3-890C-690CAFDAF9D8}"/>
               </a:ext>
             </a:extLst>
           </p:cNvPr>
@@ -3546,7 +3568,7 @@
           <p:cNvPr id="5" name="Espace réservé du pied de page 4">
             <a:extLst>
               <a:ext uri="{FF2B5EF4-FFF2-40B4-BE49-F238E27FC236}">
-                <a16:creationId xmlns:a16="http://schemas.microsoft.com/office/drawing/2014/main" id="{483B3A5C-19A5-4C3C-BEF4-E9E44242C32D}"/>
+                <a16:creationId xmlns:a16="http://schemas.microsoft.com/office/drawing/2014/main" id="{64D0238A-27A8-47DA-94E5-6ED6C905B6BD}"/>
               </a:ext>
             </a:extLst>
           </p:cNvPr>
@@ -3573,7 +3595,7 @@
     </p:spTree>
     <p:extLst>
       <p:ext uri="{BB962C8B-B14F-4D97-AF65-F5344CB8AC3E}">
-        <p14:creationId xmlns:p14="http://schemas.microsoft.com/office/powerpoint/2010/main" val="2695800203"/>
+        <p14:creationId xmlns:p14="http://schemas.microsoft.com/office/powerpoint/2010/main" val="1640635333"/>
       </p:ext>
     </p:extLst>
   </p:cSld>
@@ -3602,6 +3624,262 @@
       </p:grpSpPr>
       <p:sp>
         <p:nvSpPr>
+          <p:cNvPr id="2" name="Titre 1">
+            <a:extLst>
+              <a:ext uri="{FF2B5EF4-FFF2-40B4-BE49-F238E27FC236}">
+                <a16:creationId xmlns:a16="http://schemas.microsoft.com/office/drawing/2014/main" id="{83C8689B-5A71-4792-998D-2879B2A61738}"/>
+              </a:ext>
+            </a:extLst>
+          </p:cNvPr>
+          <p:cNvSpPr>
+            <a:spLocks noGrp="1"/>
+          </p:cNvSpPr>
+          <p:nvPr>
+            <p:ph type="title"/>
+          </p:nvPr>
+        </p:nvSpPr>
+        <p:spPr/>
+        <p:txBody>
+          <a:bodyPr/>
+          <a:lstStyle/>
+          <a:p>
+            <a:r>
+              <a:rPr lang="en-US" dirty="0"/>
+              <a:t>Who am I?</a:t>
+            </a:r>
+          </a:p>
+        </p:txBody>
+      </p:sp>
+      <p:sp>
+        <p:nvSpPr>
+          <p:cNvPr id="3" name="Espace réservé du contenu 2">
+            <a:extLst>
+              <a:ext uri="{FF2B5EF4-FFF2-40B4-BE49-F238E27FC236}">
+                <a16:creationId xmlns:a16="http://schemas.microsoft.com/office/drawing/2014/main" id="{5421B09B-39CA-4FB9-AB85-EE30FE1990BE}"/>
+              </a:ext>
+            </a:extLst>
+          </p:cNvPr>
+          <p:cNvSpPr>
+            <a:spLocks noGrp="1"/>
+          </p:cNvSpPr>
+          <p:nvPr>
+            <p:ph idx="1"/>
+          </p:nvPr>
+        </p:nvSpPr>
+        <p:spPr/>
+        <p:txBody>
+          <a:bodyPr/>
+          <a:lstStyle/>
+          <a:p>
+            <a:r>
+              <a:rPr lang="en-US" dirty="0"/>
+              <a:t>Career</a:t>
+            </a:r>
+          </a:p>
+          <a:p>
+            <a:pPr lvl="1"/>
+            <a:r>
+              <a:rPr lang="en-US" dirty="0"/>
+              <a:t>Bachelor and Master in Computer Science Engineering</a:t>
+            </a:r>
+          </a:p>
+          <a:p>
+            <a:pPr lvl="1"/>
+            <a:r>
+              <a:rPr lang="en-US" dirty="0"/>
+              <a:t>Ph.D. from </a:t>
+            </a:r>
+            <a:r>
+              <a:rPr lang="en-US" dirty="0" err="1"/>
+              <a:t>Politecnico</a:t>
+            </a:r>
+            <a:r>
+              <a:rPr lang="en-US" dirty="0"/>
+              <a:t> di Torino, Italy, in 2011</a:t>
+            </a:r>
+          </a:p>
+          <a:p>
+            <a:pPr lvl="1"/>
+            <a:r>
+              <a:rPr lang="en-US" dirty="0"/>
+              <a:t>Permanent researcher in France since late 2012 (INRAE)</a:t>
+            </a:r>
+          </a:p>
+          <a:p>
+            <a:pPr lvl="1"/>
+            <a:r>
+              <a:rPr lang="en-US" dirty="0"/>
+              <a:t>Senior researcher (DR2) since 2023</a:t>
+            </a:r>
+          </a:p>
+          <a:p>
+            <a:r>
+              <a:rPr lang="en-US" dirty="0"/>
+              <a:t>Research interests</a:t>
+            </a:r>
+          </a:p>
+          <a:p>
+            <a:pPr lvl="1"/>
+            <a:r>
+              <a:rPr lang="en-US" dirty="0"/>
+              <a:t>Stochastic optimization</a:t>
+            </a:r>
+          </a:p>
+          <a:p>
+            <a:pPr lvl="1"/>
+            <a:r>
+              <a:rPr lang="en-US" dirty="0"/>
+              <a:t>Machine learning (Explainable AI)</a:t>
+            </a:r>
+          </a:p>
+          <a:p>
+            <a:pPr lvl="1"/>
+            <a:r>
+              <a:rPr lang="en-US" dirty="0"/>
+              <a:t>Applied to biological/agri-food data</a:t>
+            </a:r>
+          </a:p>
+          <a:p>
+            <a:endParaRPr lang="en-US" dirty="0"/>
+          </a:p>
+        </p:txBody>
+      </p:sp>
+      <p:sp>
+        <p:nvSpPr>
+          <p:cNvPr id="4" name="Espace réservé du numéro de diapositive 3">
+            <a:extLst>
+              <a:ext uri="{FF2B5EF4-FFF2-40B4-BE49-F238E27FC236}">
+                <a16:creationId xmlns:a16="http://schemas.microsoft.com/office/drawing/2014/main" id="{DF063B55-A8AB-4369-B7D8-6718B065E46B}"/>
+              </a:ext>
+            </a:extLst>
+          </p:cNvPr>
+          <p:cNvSpPr>
+            <a:spLocks noGrp="1"/>
+          </p:cNvSpPr>
+          <p:nvPr>
+            <p:ph type="sldNum" sz="quarter" idx="12"/>
+          </p:nvPr>
+        </p:nvSpPr>
+        <p:spPr/>
+        <p:txBody>
+          <a:bodyPr/>
+          <a:lstStyle/>
+          <a:p>
+            <a:fld id="{19485C6F-9B8D-4FB9-A42B-A9ABFED612B1}" type="slidenum">
+              <a:rPr lang="en-US" smtClean="0"/>
+              <a:pPr/>
+              <a:t>4</a:t>
+            </a:fld>
+            <a:endParaRPr lang="en-US" dirty="0"/>
+          </a:p>
+        </p:txBody>
+      </p:sp>
+      <p:sp>
+        <p:nvSpPr>
+          <p:cNvPr id="5" name="Espace réservé du pied de page 4">
+            <a:extLst>
+              <a:ext uri="{FF2B5EF4-FFF2-40B4-BE49-F238E27FC236}">
+                <a16:creationId xmlns:a16="http://schemas.microsoft.com/office/drawing/2014/main" id="{483B3A5C-19A5-4C3C-BEF4-E9E44242C32D}"/>
+              </a:ext>
+            </a:extLst>
+          </p:cNvPr>
+          <p:cNvSpPr>
+            <a:spLocks noGrp="1"/>
+          </p:cNvSpPr>
+          <p:nvPr>
+            <p:ph type="ftr" sz="quarter" idx="3"/>
+          </p:nvPr>
+        </p:nvSpPr>
+        <p:spPr/>
+        <p:txBody>
+          <a:bodyPr/>
+          <a:lstStyle/>
+          <a:p>
+            <a:r>
+              <a:rPr lang="en-US"/>
+              <a:t>alberto.tonda@inrae.fr</a:t>
+            </a:r>
+            <a:endParaRPr lang="en-US" dirty="0"/>
+          </a:p>
+        </p:txBody>
+      </p:sp>
+      <p:pic>
+        <p:nvPicPr>
+          <p:cNvPr id="6" name="Picture 2" descr="Image result for polandball italy france">
+            <a:extLst>
+              <a:ext uri="{FF2B5EF4-FFF2-40B4-BE49-F238E27FC236}">
+                <a16:creationId xmlns:a16="http://schemas.microsoft.com/office/drawing/2014/main" id="{90BAF886-7F48-4AF7-BF3A-D8F6978DF1CA}"/>
+              </a:ext>
+            </a:extLst>
+          </p:cNvPr>
+          <p:cNvPicPr>
+            <a:picLocks noChangeAspect="1" noChangeArrowheads="1"/>
+          </p:cNvPicPr>
+          <p:nvPr/>
+        </p:nvPicPr>
+        <p:blipFill rotWithShape="1">
+          <a:blip r:embed="rId2" cstate="print">
+            <a:extLst>
+              <a:ext uri="{28A0092B-C50C-407E-A947-70E740481C1C}">
+                <a14:useLocalDpi xmlns:a14="http://schemas.microsoft.com/office/drawing/2010/main" val="0"/>
+              </a:ext>
+            </a:extLst>
+          </a:blip>
+          <a:srcRect r="6930"/>
+          <a:stretch/>
+        </p:blipFill>
+        <p:spPr bwMode="auto">
+          <a:xfrm>
+            <a:off x="6985262" y="3314570"/>
+            <a:ext cx="5206738" cy="2974384"/>
+          </a:xfrm>
+          <a:prstGeom prst="rect">
+            <a:avLst/>
+          </a:prstGeom>
+          <a:noFill/>
+          <a:extLst>
+            <a:ext uri="{909E8E84-426E-40DD-AFC4-6F175D3DCCD1}">
+              <a14:hiddenFill xmlns:a14="http://schemas.microsoft.com/office/drawing/2010/main">
+                <a:solidFill>
+                  <a:srgbClr val="FFFFFF"/>
+                </a:solidFill>
+              </a14:hiddenFill>
+            </a:ext>
+          </a:extLst>
+        </p:spPr>
+      </p:pic>
+    </p:spTree>
+    <p:extLst>
+      <p:ext uri="{BB962C8B-B14F-4D97-AF65-F5344CB8AC3E}">
+        <p14:creationId xmlns:p14="http://schemas.microsoft.com/office/powerpoint/2010/main" val="2695800203"/>
+      </p:ext>
+    </p:extLst>
+  </p:cSld>
+  <p:clrMapOvr>
+    <a:masterClrMapping/>
+  </p:clrMapOvr>
+</p:sld>
+</file>
+
+<file path=ppt/slides/slide5.xml><?xml version="1.0" encoding="utf-8"?>
+<p:sld xmlns:a="http://schemas.openxmlformats.org/drawingml/2006/main" xmlns:r="http://schemas.openxmlformats.org/officeDocument/2006/relationships" xmlns:p="http://schemas.openxmlformats.org/presentationml/2006/main">
+  <p:cSld>
+    <p:spTree>
+      <p:nvGrpSpPr>
+        <p:cNvPr id="1" name=""/>
+        <p:cNvGrpSpPr/>
+        <p:nvPr/>
+      </p:nvGrpSpPr>
+      <p:grpSpPr>
+        <a:xfrm>
+          <a:off x="0" y="0"/>
+          <a:ext cx="0" cy="0"/>
+          <a:chOff x="0" y="0"/>
+          <a:chExt cx="0" cy="0"/>
+        </a:xfrm>
+      </p:grpSpPr>
+      <p:sp>
+        <p:nvSpPr>
           <p:cNvPr id="6" name="Titre 5">
             <a:extLst>
               <a:ext uri="{FF2B5EF4-FFF2-40B4-BE49-F238E27FC236}">
@@ -3621,7 +3899,10 @@
           <a:bodyPr/>
           <a:lstStyle/>
           <a:p>
-            <a:endParaRPr lang="en-US"/>
+            <a:r>
+              <a:rPr lang="en-US" dirty="0"/>
+              <a:t>Questions?</a:t>
+            </a:r>
           </a:p>
         </p:txBody>
       </p:sp>
@@ -3679,7 +3960,7 @@
             <a:fld id="{19485C6F-9B8D-4FB9-A42B-A9ABFED612B1}" type="slidenum">
               <a:rPr lang="en-US" smtClean="0"/>
               <a:pPr/>
-              <a:t>4</a:t>
+              <a:t>5</a:t>
             </a:fld>
             <a:endParaRPr lang="en-US" dirty="0"/>
           </a:p>

</xml_diff>